<commit_message>
docs(20210204): add meetup ppt
</commit_message>
<xml_diff>
--- a/202102/slides/云原生时代的Java与Reactive-技术路线-Kevin.pptx
+++ b/202102/slides/云原生时代的Java与Reactive-技术路线-Kevin.pptx
@@ -4479,36 +4479,6 @@
           <a:chExt cx="0" cy="0"/>
         </a:xfrm>
       </p:grpSpPr>
-      <p:pic>
-        <p:nvPicPr>
-          <p:cNvPr id="4" name="图片 3"/>
-          <p:cNvPicPr>
-            <a:picLocks noChangeAspect="1"/>
-          </p:cNvPicPr>
-          <p:nvPr/>
-        </p:nvPicPr>
-        <p:blipFill>
-          <a:blip r:embed="rId2">
-            <a:extLst>
-              <a:ext uri="{28A0092B-C50C-407E-A947-70E740481C1C}">
-                <a14:useLocalDpi xmlns:a14="http://schemas.microsoft.com/office/drawing/2010/main" val="0"/>
-              </a:ext>
-            </a:extLst>
-          </a:blip>
-          <a:stretch>
-            <a:fillRect/>
-          </a:stretch>
-        </p:blipFill>
-        <p:spPr>
-          <a:xfrm>
-            <a:off x="431676" y="231373"/>
-            <a:ext cx="1219570" cy="295057"/>
-          </a:xfrm>
-          <a:prstGeom prst="rect">
-            <a:avLst/>
-          </a:prstGeom>
-        </p:spPr>
-      </p:pic>
       <p:cxnSp>
         <p:nvCxnSpPr>
           <p:cNvPr id="6" name="直接连接符 5"/>

</xml_diff>